<commit_message>
this makes changes to powerpoint presentation
</commit_message>
<xml_diff>
--- a/Friday Night Roulette.pptx
+++ b/Friday Night Roulette.pptx
@@ -145,7 +145,7 @@
           <p:cNvPr id="2" name="Title 1">
             <a:extLst>
               <a:ext uri="{FF2B5EF4-FFF2-40B4-BE49-F238E27FC236}">
-                <a16:creationId xmlns:a16="http://schemas.microsoft.com/office/drawing/2014/main" id="{CF7E7519-0C89-479F-B5CB-D87A0DFD7FE1}"/>
+                <a16:creationId xmlns:a16="http://schemas.microsoft.com/office/drawing/2014/main" xmlns="" id="{CF7E7519-0C89-479F-B5CB-D87A0DFD7FE1}"/>
               </a:ext>
             </a:extLst>
           </p:cNvPr>
@@ -182,7 +182,7 @@
           <p:cNvPr id="3" name="Subtitle 2">
             <a:extLst>
               <a:ext uri="{FF2B5EF4-FFF2-40B4-BE49-F238E27FC236}">
-                <a16:creationId xmlns:a16="http://schemas.microsoft.com/office/drawing/2014/main" id="{AB1734A7-8E4F-4E12-BD9A-80CBE8A3FF12}"/>
+                <a16:creationId xmlns:a16="http://schemas.microsoft.com/office/drawing/2014/main" xmlns="" id="{AB1734A7-8E4F-4E12-BD9A-80CBE8A3FF12}"/>
               </a:ext>
             </a:extLst>
           </p:cNvPr>
@@ -252,7 +252,7 @@
           <p:cNvPr id="4" name="Date Placeholder 3">
             <a:extLst>
               <a:ext uri="{FF2B5EF4-FFF2-40B4-BE49-F238E27FC236}">
-                <a16:creationId xmlns:a16="http://schemas.microsoft.com/office/drawing/2014/main" id="{2C034C50-8FEA-48BA-8324-9477741A9D4F}"/>
+                <a16:creationId xmlns:a16="http://schemas.microsoft.com/office/drawing/2014/main" xmlns="" id="{2C034C50-8FEA-48BA-8324-9477741A9D4F}"/>
               </a:ext>
             </a:extLst>
           </p:cNvPr>
@@ -270,7 +270,7 @@
           <a:p>
             <a:fld id="{4FAA584B-5F4A-43DA-A077-3E9FF98D4E55}" type="datetimeFigureOut">
               <a:rPr lang="en-US" smtClean="0"/>
-              <a:t>12/11/2017</a:t>
+              <a:t>12/12/2017</a:t>
             </a:fld>
             <a:endParaRPr lang="en-US"/>
           </a:p>
@@ -281,7 +281,7 @@
           <p:cNvPr id="5" name="Footer Placeholder 4">
             <a:extLst>
               <a:ext uri="{FF2B5EF4-FFF2-40B4-BE49-F238E27FC236}">
-                <a16:creationId xmlns:a16="http://schemas.microsoft.com/office/drawing/2014/main" id="{CB80FFD9-2B9F-4E2D-968B-C1CC8C4B0B7C}"/>
+                <a16:creationId xmlns:a16="http://schemas.microsoft.com/office/drawing/2014/main" xmlns="" id="{CB80FFD9-2B9F-4E2D-968B-C1CC8C4B0B7C}"/>
               </a:ext>
             </a:extLst>
           </p:cNvPr>
@@ -306,7 +306,7 @@
           <p:cNvPr id="6" name="Slide Number Placeholder 5">
             <a:extLst>
               <a:ext uri="{FF2B5EF4-FFF2-40B4-BE49-F238E27FC236}">
-                <a16:creationId xmlns:a16="http://schemas.microsoft.com/office/drawing/2014/main" id="{EDDB98B3-2C16-439C-8564-6930C2047A36}"/>
+                <a16:creationId xmlns:a16="http://schemas.microsoft.com/office/drawing/2014/main" xmlns="" id="{EDDB98B3-2C16-439C-8564-6930C2047A36}"/>
               </a:ext>
             </a:extLst>
           </p:cNvPr>
@@ -365,7 +365,7 @@
           <p:cNvPr id="2" name="Title 1">
             <a:extLst>
               <a:ext uri="{FF2B5EF4-FFF2-40B4-BE49-F238E27FC236}">
-                <a16:creationId xmlns:a16="http://schemas.microsoft.com/office/drawing/2014/main" id="{76127872-B0C0-4310-9C24-2D2DF9C91084}"/>
+                <a16:creationId xmlns:a16="http://schemas.microsoft.com/office/drawing/2014/main" xmlns="" id="{76127872-B0C0-4310-9C24-2D2DF9C91084}"/>
               </a:ext>
             </a:extLst>
           </p:cNvPr>
@@ -393,7 +393,7 @@
           <p:cNvPr id="3" name="Vertical Text Placeholder 2">
             <a:extLst>
               <a:ext uri="{FF2B5EF4-FFF2-40B4-BE49-F238E27FC236}">
-                <a16:creationId xmlns:a16="http://schemas.microsoft.com/office/drawing/2014/main" id="{CE533D6F-F61C-4C57-8C19-6238C3D734A4}"/>
+                <a16:creationId xmlns:a16="http://schemas.microsoft.com/office/drawing/2014/main" xmlns="" id="{CE533D6F-F61C-4C57-8C19-6238C3D734A4}"/>
               </a:ext>
             </a:extLst>
           </p:cNvPr>
@@ -450,7 +450,7 @@
           <p:cNvPr id="4" name="Date Placeholder 3">
             <a:extLst>
               <a:ext uri="{FF2B5EF4-FFF2-40B4-BE49-F238E27FC236}">
-                <a16:creationId xmlns:a16="http://schemas.microsoft.com/office/drawing/2014/main" id="{D583DD13-E009-4E81-8C8A-2485081A406A}"/>
+                <a16:creationId xmlns:a16="http://schemas.microsoft.com/office/drawing/2014/main" xmlns="" id="{D583DD13-E009-4E81-8C8A-2485081A406A}"/>
               </a:ext>
             </a:extLst>
           </p:cNvPr>
@@ -468,7 +468,7 @@
           <a:p>
             <a:fld id="{4FAA584B-5F4A-43DA-A077-3E9FF98D4E55}" type="datetimeFigureOut">
               <a:rPr lang="en-US" smtClean="0"/>
-              <a:t>12/11/2017</a:t>
+              <a:t>12/12/2017</a:t>
             </a:fld>
             <a:endParaRPr lang="en-US"/>
           </a:p>
@@ -479,7 +479,7 @@
           <p:cNvPr id="5" name="Footer Placeholder 4">
             <a:extLst>
               <a:ext uri="{FF2B5EF4-FFF2-40B4-BE49-F238E27FC236}">
-                <a16:creationId xmlns:a16="http://schemas.microsoft.com/office/drawing/2014/main" id="{CD5439A5-EDB1-4E09-A33D-9689FD55B68C}"/>
+                <a16:creationId xmlns:a16="http://schemas.microsoft.com/office/drawing/2014/main" xmlns="" id="{CD5439A5-EDB1-4E09-A33D-9689FD55B68C}"/>
               </a:ext>
             </a:extLst>
           </p:cNvPr>
@@ -504,7 +504,7 @@
           <p:cNvPr id="6" name="Slide Number Placeholder 5">
             <a:extLst>
               <a:ext uri="{FF2B5EF4-FFF2-40B4-BE49-F238E27FC236}">
-                <a16:creationId xmlns:a16="http://schemas.microsoft.com/office/drawing/2014/main" id="{848A0064-06DC-461B-81E6-E3EDF24F74CA}"/>
+                <a16:creationId xmlns:a16="http://schemas.microsoft.com/office/drawing/2014/main" xmlns="" id="{848A0064-06DC-461B-81E6-E3EDF24F74CA}"/>
               </a:ext>
             </a:extLst>
           </p:cNvPr>
@@ -563,7 +563,7 @@
           <p:cNvPr id="2" name="Vertical Title 1">
             <a:extLst>
               <a:ext uri="{FF2B5EF4-FFF2-40B4-BE49-F238E27FC236}">
-                <a16:creationId xmlns:a16="http://schemas.microsoft.com/office/drawing/2014/main" id="{2A9611C4-40CC-45D8-BB5C-5CF4C3370A21}"/>
+                <a16:creationId xmlns:a16="http://schemas.microsoft.com/office/drawing/2014/main" xmlns="" id="{2A9611C4-40CC-45D8-BB5C-5CF4C3370A21}"/>
               </a:ext>
             </a:extLst>
           </p:cNvPr>
@@ -596,7 +596,7 @@
           <p:cNvPr id="3" name="Vertical Text Placeholder 2">
             <a:extLst>
               <a:ext uri="{FF2B5EF4-FFF2-40B4-BE49-F238E27FC236}">
-                <a16:creationId xmlns:a16="http://schemas.microsoft.com/office/drawing/2014/main" id="{4444BBDA-5FFF-4EE7-B780-2A2BBD76FD88}"/>
+                <a16:creationId xmlns:a16="http://schemas.microsoft.com/office/drawing/2014/main" xmlns="" id="{4444BBDA-5FFF-4EE7-B780-2A2BBD76FD88}"/>
               </a:ext>
             </a:extLst>
           </p:cNvPr>
@@ -658,7 +658,7 @@
           <p:cNvPr id="4" name="Date Placeholder 3">
             <a:extLst>
               <a:ext uri="{FF2B5EF4-FFF2-40B4-BE49-F238E27FC236}">
-                <a16:creationId xmlns:a16="http://schemas.microsoft.com/office/drawing/2014/main" id="{91C72AF5-D4EC-42FA-9AD0-EAC13584110A}"/>
+                <a16:creationId xmlns:a16="http://schemas.microsoft.com/office/drawing/2014/main" xmlns="" id="{91C72AF5-D4EC-42FA-9AD0-EAC13584110A}"/>
               </a:ext>
             </a:extLst>
           </p:cNvPr>
@@ -676,7 +676,7 @@
           <a:p>
             <a:fld id="{4FAA584B-5F4A-43DA-A077-3E9FF98D4E55}" type="datetimeFigureOut">
               <a:rPr lang="en-US" smtClean="0"/>
-              <a:t>12/11/2017</a:t>
+              <a:t>12/12/2017</a:t>
             </a:fld>
             <a:endParaRPr lang="en-US"/>
           </a:p>
@@ -687,7 +687,7 @@
           <p:cNvPr id="5" name="Footer Placeholder 4">
             <a:extLst>
               <a:ext uri="{FF2B5EF4-FFF2-40B4-BE49-F238E27FC236}">
-                <a16:creationId xmlns:a16="http://schemas.microsoft.com/office/drawing/2014/main" id="{92729D0C-4736-4A89-9788-ABFC685A9195}"/>
+                <a16:creationId xmlns:a16="http://schemas.microsoft.com/office/drawing/2014/main" xmlns="" id="{92729D0C-4736-4A89-9788-ABFC685A9195}"/>
               </a:ext>
             </a:extLst>
           </p:cNvPr>
@@ -712,7 +712,7 @@
           <p:cNvPr id="6" name="Slide Number Placeholder 5">
             <a:extLst>
               <a:ext uri="{FF2B5EF4-FFF2-40B4-BE49-F238E27FC236}">
-                <a16:creationId xmlns:a16="http://schemas.microsoft.com/office/drawing/2014/main" id="{885A5D7E-E200-4F52-A368-B104F3477417}"/>
+                <a16:creationId xmlns:a16="http://schemas.microsoft.com/office/drawing/2014/main" xmlns="" id="{885A5D7E-E200-4F52-A368-B104F3477417}"/>
               </a:ext>
             </a:extLst>
           </p:cNvPr>
@@ -771,7 +771,7 @@
           <p:cNvPr id="2" name="Title 1">
             <a:extLst>
               <a:ext uri="{FF2B5EF4-FFF2-40B4-BE49-F238E27FC236}">
-                <a16:creationId xmlns:a16="http://schemas.microsoft.com/office/drawing/2014/main" id="{3755B704-98E5-43E6-A432-E90F10EE8535}"/>
+                <a16:creationId xmlns:a16="http://schemas.microsoft.com/office/drawing/2014/main" xmlns="" id="{3755B704-98E5-43E6-A432-E90F10EE8535}"/>
               </a:ext>
             </a:extLst>
           </p:cNvPr>
@@ -799,7 +799,7 @@
           <p:cNvPr id="3" name="Content Placeholder 2">
             <a:extLst>
               <a:ext uri="{FF2B5EF4-FFF2-40B4-BE49-F238E27FC236}">
-                <a16:creationId xmlns:a16="http://schemas.microsoft.com/office/drawing/2014/main" id="{AD61C71B-F868-46E1-85FC-CAB0C54BBE34}"/>
+                <a16:creationId xmlns:a16="http://schemas.microsoft.com/office/drawing/2014/main" xmlns="" id="{AD61C71B-F868-46E1-85FC-CAB0C54BBE34}"/>
               </a:ext>
             </a:extLst>
           </p:cNvPr>
@@ -856,7 +856,7 @@
           <p:cNvPr id="4" name="Date Placeholder 3">
             <a:extLst>
               <a:ext uri="{FF2B5EF4-FFF2-40B4-BE49-F238E27FC236}">
-                <a16:creationId xmlns:a16="http://schemas.microsoft.com/office/drawing/2014/main" id="{C40F1B4D-B522-4B2B-8455-F60FDDC52B5B}"/>
+                <a16:creationId xmlns:a16="http://schemas.microsoft.com/office/drawing/2014/main" xmlns="" id="{C40F1B4D-B522-4B2B-8455-F60FDDC52B5B}"/>
               </a:ext>
             </a:extLst>
           </p:cNvPr>
@@ -874,7 +874,7 @@
           <a:p>
             <a:fld id="{4FAA584B-5F4A-43DA-A077-3E9FF98D4E55}" type="datetimeFigureOut">
               <a:rPr lang="en-US" smtClean="0"/>
-              <a:t>12/11/2017</a:t>
+              <a:t>12/12/2017</a:t>
             </a:fld>
             <a:endParaRPr lang="en-US"/>
           </a:p>
@@ -885,7 +885,7 @@
           <p:cNvPr id="5" name="Footer Placeholder 4">
             <a:extLst>
               <a:ext uri="{FF2B5EF4-FFF2-40B4-BE49-F238E27FC236}">
-                <a16:creationId xmlns:a16="http://schemas.microsoft.com/office/drawing/2014/main" id="{A8BE6B9A-79E6-45FD-B94C-32C87F9559F9}"/>
+                <a16:creationId xmlns:a16="http://schemas.microsoft.com/office/drawing/2014/main" xmlns="" id="{A8BE6B9A-79E6-45FD-B94C-32C87F9559F9}"/>
               </a:ext>
             </a:extLst>
           </p:cNvPr>
@@ -910,7 +910,7 @@
           <p:cNvPr id="6" name="Slide Number Placeholder 5">
             <a:extLst>
               <a:ext uri="{FF2B5EF4-FFF2-40B4-BE49-F238E27FC236}">
-                <a16:creationId xmlns:a16="http://schemas.microsoft.com/office/drawing/2014/main" id="{8BABA2D3-B878-415A-8AE9-1ACCFDF88A80}"/>
+                <a16:creationId xmlns:a16="http://schemas.microsoft.com/office/drawing/2014/main" xmlns="" id="{8BABA2D3-B878-415A-8AE9-1ACCFDF88A80}"/>
               </a:ext>
             </a:extLst>
           </p:cNvPr>
@@ -969,7 +969,7 @@
           <p:cNvPr id="2" name="Title 1">
             <a:extLst>
               <a:ext uri="{FF2B5EF4-FFF2-40B4-BE49-F238E27FC236}">
-                <a16:creationId xmlns:a16="http://schemas.microsoft.com/office/drawing/2014/main" id="{2E4D33D1-10A0-403B-A8C8-14250A5269C9}"/>
+                <a16:creationId xmlns:a16="http://schemas.microsoft.com/office/drawing/2014/main" xmlns="" id="{2E4D33D1-10A0-403B-A8C8-14250A5269C9}"/>
               </a:ext>
             </a:extLst>
           </p:cNvPr>
@@ -1006,7 +1006,7 @@
           <p:cNvPr id="3" name="Text Placeholder 2">
             <a:extLst>
               <a:ext uri="{FF2B5EF4-FFF2-40B4-BE49-F238E27FC236}">
-                <a16:creationId xmlns:a16="http://schemas.microsoft.com/office/drawing/2014/main" id="{297B1F18-DF53-41AD-B652-F7FDABE24A42}"/>
+                <a16:creationId xmlns:a16="http://schemas.microsoft.com/office/drawing/2014/main" xmlns="" id="{297B1F18-DF53-41AD-B652-F7FDABE24A42}"/>
               </a:ext>
             </a:extLst>
           </p:cNvPr>
@@ -1131,7 +1131,7 @@
           <p:cNvPr id="4" name="Date Placeholder 3">
             <a:extLst>
               <a:ext uri="{FF2B5EF4-FFF2-40B4-BE49-F238E27FC236}">
-                <a16:creationId xmlns:a16="http://schemas.microsoft.com/office/drawing/2014/main" id="{86306567-61C2-44DF-A680-CCC60691B05B}"/>
+                <a16:creationId xmlns:a16="http://schemas.microsoft.com/office/drawing/2014/main" xmlns="" id="{86306567-61C2-44DF-A680-CCC60691B05B}"/>
               </a:ext>
             </a:extLst>
           </p:cNvPr>
@@ -1149,7 +1149,7 @@
           <a:p>
             <a:fld id="{4FAA584B-5F4A-43DA-A077-3E9FF98D4E55}" type="datetimeFigureOut">
               <a:rPr lang="en-US" smtClean="0"/>
-              <a:t>12/11/2017</a:t>
+              <a:t>12/12/2017</a:t>
             </a:fld>
             <a:endParaRPr lang="en-US"/>
           </a:p>
@@ -1160,7 +1160,7 @@
           <p:cNvPr id="5" name="Footer Placeholder 4">
             <a:extLst>
               <a:ext uri="{FF2B5EF4-FFF2-40B4-BE49-F238E27FC236}">
-                <a16:creationId xmlns:a16="http://schemas.microsoft.com/office/drawing/2014/main" id="{13625BBA-9F1D-45F3-8CA6-6795841EAC5F}"/>
+                <a16:creationId xmlns:a16="http://schemas.microsoft.com/office/drawing/2014/main" xmlns="" id="{13625BBA-9F1D-45F3-8CA6-6795841EAC5F}"/>
               </a:ext>
             </a:extLst>
           </p:cNvPr>
@@ -1185,7 +1185,7 @@
           <p:cNvPr id="6" name="Slide Number Placeholder 5">
             <a:extLst>
               <a:ext uri="{FF2B5EF4-FFF2-40B4-BE49-F238E27FC236}">
-                <a16:creationId xmlns:a16="http://schemas.microsoft.com/office/drawing/2014/main" id="{7935BAFF-BA82-4893-93B1-9FB88DDC81E6}"/>
+                <a16:creationId xmlns:a16="http://schemas.microsoft.com/office/drawing/2014/main" xmlns="" id="{7935BAFF-BA82-4893-93B1-9FB88DDC81E6}"/>
               </a:ext>
             </a:extLst>
           </p:cNvPr>
@@ -1244,7 +1244,7 @@
           <p:cNvPr id="2" name="Title 1">
             <a:extLst>
               <a:ext uri="{FF2B5EF4-FFF2-40B4-BE49-F238E27FC236}">
-                <a16:creationId xmlns:a16="http://schemas.microsoft.com/office/drawing/2014/main" id="{BCEBEBD6-422C-4718-8797-79E43FB2CAA3}"/>
+                <a16:creationId xmlns:a16="http://schemas.microsoft.com/office/drawing/2014/main" xmlns="" id="{BCEBEBD6-422C-4718-8797-79E43FB2CAA3}"/>
               </a:ext>
             </a:extLst>
           </p:cNvPr>
@@ -1272,7 +1272,7 @@
           <p:cNvPr id="3" name="Content Placeholder 2">
             <a:extLst>
               <a:ext uri="{FF2B5EF4-FFF2-40B4-BE49-F238E27FC236}">
-                <a16:creationId xmlns:a16="http://schemas.microsoft.com/office/drawing/2014/main" id="{0979A426-E165-4F39-9F35-29039826D830}"/>
+                <a16:creationId xmlns:a16="http://schemas.microsoft.com/office/drawing/2014/main" xmlns="" id="{0979A426-E165-4F39-9F35-29039826D830}"/>
               </a:ext>
             </a:extLst>
           </p:cNvPr>
@@ -1334,7 +1334,7 @@
           <p:cNvPr id="4" name="Content Placeholder 3">
             <a:extLst>
               <a:ext uri="{FF2B5EF4-FFF2-40B4-BE49-F238E27FC236}">
-                <a16:creationId xmlns:a16="http://schemas.microsoft.com/office/drawing/2014/main" id="{4628255D-A32F-4D3F-99A6-B36CB7C05E3A}"/>
+                <a16:creationId xmlns:a16="http://schemas.microsoft.com/office/drawing/2014/main" xmlns="" id="{4628255D-A32F-4D3F-99A6-B36CB7C05E3A}"/>
               </a:ext>
             </a:extLst>
           </p:cNvPr>
@@ -1396,7 +1396,7 @@
           <p:cNvPr id="5" name="Date Placeholder 4">
             <a:extLst>
               <a:ext uri="{FF2B5EF4-FFF2-40B4-BE49-F238E27FC236}">
-                <a16:creationId xmlns:a16="http://schemas.microsoft.com/office/drawing/2014/main" id="{EE18BE44-D952-41FC-838C-D522BB7D980F}"/>
+                <a16:creationId xmlns:a16="http://schemas.microsoft.com/office/drawing/2014/main" xmlns="" id="{EE18BE44-D952-41FC-838C-D522BB7D980F}"/>
               </a:ext>
             </a:extLst>
           </p:cNvPr>
@@ -1414,7 +1414,7 @@
           <a:p>
             <a:fld id="{4FAA584B-5F4A-43DA-A077-3E9FF98D4E55}" type="datetimeFigureOut">
               <a:rPr lang="en-US" smtClean="0"/>
-              <a:t>12/11/2017</a:t>
+              <a:t>12/12/2017</a:t>
             </a:fld>
             <a:endParaRPr lang="en-US"/>
           </a:p>
@@ -1425,7 +1425,7 @@
           <p:cNvPr id="6" name="Footer Placeholder 5">
             <a:extLst>
               <a:ext uri="{FF2B5EF4-FFF2-40B4-BE49-F238E27FC236}">
-                <a16:creationId xmlns:a16="http://schemas.microsoft.com/office/drawing/2014/main" id="{2963DDAF-BD18-4ABB-B2B5-D2E06526237A}"/>
+                <a16:creationId xmlns:a16="http://schemas.microsoft.com/office/drawing/2014/main" xmlns="" id="{2963DDAF-BD18-4ABB-B2B5-D2E06526237A}"/>
               </a:ext>
             </a:extLst>
           </p:cNvPr>
@@ -1450,7 +1450,7 @@
           <p:cNvPr id="7" name="Slide Number Placeholder 6">
             <a:extLst>
               <a:ext uri="{FF2B5EF4-FFF2-40B4-BE49-F238E27FC236}">
-                <a16:creationId xmlns:a16="http://schemas.microsoft.com/office/drawing/2014/main" id="{F03D869A-3EE8-4338-B577-BAAF4CC51E9F}"/>
+                <a16:creationId xmlns:a16="http://schemas.microsoft.com/office/drawing/2014/main" xmlns="" id="{F03D869A-3EE8-4338-B577-BAAF4CC51E9F}"/>
               </a:ext>
             </a:extLst>
           </p:cNvPr>
@@ -1509,7 +1509,7 @@
           <p:cNvPr id="2" name="Title 1">
             <a:extLst>
               <a:ext uri="{FF2B5EF4-FFF2-40B4-BE49-F238E27FC236}">
-                <a16:creationId xmlns:a16="http://schemas.microsoft.com/office/drawing/2014/main" id="{C09E3D53-DD3B-4606-AA3D-42715F66204E}"/>
+                <a16:creationId xmlns:a16="http://schemas.microsoft.com/office/drawing/2014/main" xmlns="" id="{C09E3D53-DD3B-4606-AA3D-42715F66204E}"/>
               </a:ext>
             </a:extLst>
           </p:cNvPr>
@@ -1542,7 +1542,7 @@
           <p:cNvPr id="3" name="Text Placeholder 2">
             <a:extLst>
               <a:ext uri="{FF2B5EF4-FFF2-40B4-BE49-F238E27FC236}">
-                <a16:creationId xmlns:a16="http://schemas.microsoft.com/office/drawing/2014/main" id="{2D3875DD-2249-43B0-9686-86DA8381167A}"/>
+                <a16:creationId xmlns:a16="http://schemas.microsoft.com/office/drawing/2014/main" xmlns="" id="{2D3875DD-2249-43B0-9686-86DA8381167A}"/>
               </a:ext>
             </a:extLst>
           </p:cNvPr>
@@ -1613,7 +1613,7 @@
           <p:cNvPr id="4" name="Content Placeholder 3">
             <a:extLst>
               <a:ext uri="{FF2B5EF4-FFF2-40B4-BE49-F238E27FC236}">
-                <a16:creationId xmlns:a16="http://schemas.microsoft.com/office/drawing/2014/main" id="{F01824D0-15BD-4F82-9C9E-21BD74D5DEC5}"/>
+                <a16:creationId xmlns:a16="http://schemas.microsoft.com/office/drawing/2014/main" xmlns="" id="{F01824D0-15BD-4F82-9C9E-21BD74D5DEC5}"/>
               </a:ext>
             </a:extLst>
           </p:cNvPr>
@@ -1675,7 +1675,7 @@
           <p:cNvPr id="5" name="Text Placeholder 4">
             <a:extLst>
               <a:ext uri="{FF2B5EF4-FFF2-40B4-BE49-F238E27FC236}">
-                <a16:creationId xmlns:a16="http://schemas.microsoft.com/office/drawing/2014/main" id="{ADA9DD74-2103-44C6-81CD-CB85F43D820B}"/>
+                <a16:creationId xmlns:a16="http://schemas.microsoft.com/office/drawing/2014/main" xmlns="" id="{ADA9DD74-2103-44C6-81CD-CB85F43D820B}"/>
               </a:ext>
             </a:extLst>
           </p:cNvPr>
@@ -1746,7 +1746,7 @@
           <p:cNvPr id="6" name="Content Placeholder 5">
             <a:extLst>
               <a:ext uri="{FF2B5EF4-FFF2-40B4-BE49-F238E27FC236}">
-                <a16:creationId xmlns:a16="http://schemas.microsoft.com/office/drawing/2014/main" id="{9A27FDA1-E379-4B22-8F2A-CF97DCE4C018}"/>
+                <a16:creationId xmlns:a16="http://schemas.microsoft.com/office/drawing/2014/main" xmlns="" id="{9A27FDA1-E379-4B22-8F2A-CF97DCE4C018}"/>
               </a:ext>
             </a:extLst>
           </p:cNvPr>
@@ -1808,7 +1808,7 @@
           <p:cNvPr id="7" name="Date Placeholder 6">
             <a:extLst>
               <a:ext uri="{FF2B5EF4-FFF2-40B4-BE49-F238E27FC236}">
-                <a16:creationId xmlns:a16="http://schemas.microsoft.com/office/drawing/2014/main" id="{829CB38F-D1F5-4D76-81A1-0621FAB0F401}"/>
+                <a16:creationId xmlns:a16="http://schemas.microsoft.com/office/drawing/2014/main" xmlns="" id="{829CB38F-D1F5-4D76-81A1-0621FAB0F401}"/>
               </a:ext>
             </a:extLst>
           </p:cNvPr>
@@ -1826,7 +1826,7 @@
           <a:p>
             <a:fld id="{4FAA584B-5F4A-43DA-A077-3E9FF98D4E55}" type="datetimeFigureOut">
               <a:rPr lang="en-US" smtClean="0"/>
-              <a:t>12/11/2017</a:t>
+              <a:t>12/12/2017</a:t>
             </a:fld>
             <a:endParaRPr lang="en-US"/>
           </a:p>
@@ -1837,7 +1837,7 @@
           <p:cNvPr id="8" name="Footer Placeholder 7">
             <a:extLst>
               <a:ext uri="{FF2B5EF4-FFF2-40B4-BE49-F238E27FC236}">
-                <a16:creationId xmlns:a16="http://schemas.microsoft.com/office/drawing/2014/main" id="{F18D2138-7559-4CD5-9E53-2C165B714283}"/>
+                <a16:creationId xmlns:a16="http://schemas.microsoft.com/office/drawing/2014/main" xmlns="" id="{F18D2138-7559-4CD5-9E53-2C165B714283}"/>
               </a:ext>
             </a:extLst>
           </p:cNvPr>
@@ -1862,7 +1862,7 @@
           <p:cNvPr id="9" name="Slide Number Placeholder 8">
             <a:extLst>
               <a:ext uri="{FF2B5EF4-FFF2-40B4-BE49-F238E27FC236}">
-                <a16:creationId xmlns:a16="http://schemas.microsoft.com/office/drawing/2014/main" id="{39B566D6-2D4D-4C52-A8C7-6B0541B9FEC6}"/>
+                <a16:creationId xmlns:a16="http://schemas.microsoft.com/office/drawing/2014/main" xmlns="" id="{39B566D6-2D4D-4C52-A8C7-6B0541B9FEC6}"/>
               </a:ext>
             </a:extLst>
           </p:cNvPr>
@@ -1921,7 +1921,7 @@
           <p:cNvPr id="2" name="Title 1">
             <a:extLst>
               <a:ext uri="{FF2B5EF4-FFF2-40B4-BE49-F238E27FC236}">
-                <a16:creationId xmlns:a16="http://schemas.microsoft.com/office/drawing/2014/main" id="{28A236CB-B566-4631-8AA4-3A8C40A66A26}"/>
+                <a16:creationId xmlns:a16="http://schemas.microsoft.com/office/drawing/2014/main" xmlns="" id="{28A236CB-B566-4631-8AA4-3A8C40A66A26}"/>
               </a:ext>
             </a:extLst>
           </p:cNvPr>
@@ -1949,7 +1949,7 @@
           <p:cNvPr id="3" name="Date Placeholder 2">
             <a:extLst>
               <a:ext uri="{FF2B5EF4-FFF2-40B4-BE49-F238E27FC236}">
-                <a16:creationId xmlns:a16="http://schemas.microsoft.com/office/drawing/2014/main" id="{8E7BA5DA-0F7D-464D-85DF-D892140D4B50}"/>
+                <a16:creationId xmlns:a16="http://schemas.microsoft.com/office/drawing/2014/main" xmlns="" id="{8E7BA5DA-0F7D-464D-85DF-D892140D4B50}"/>
               </a:ext>
             </a:extLst>
           </p:cNvPr>
@@ -1967,7 +1967,7 @@
           <a:p>
             <a:fld id="{4FAA584B-5F4A-43DA-A077-3E9FF98D4E55}" type="datetimeFigureOut">
               <a:rPr lang="en-US" smtClean="0"/>
-              <a:t>12/11/2017</a:t>
+              <a:t>12/12/2017</a:t>
             </a:fld>
             <a:endParaRPr lang="en-US"/>
           </a:p>
@@ -1978,7 +1978,7 @@
           <p:cNvPr id="4" name="Footer Placeholder 3">
             <a:extLst>
               <a:ext uri="{FF2B5EF4-FFF2-40B4-BE49-F238E27FC236}">
-                <a16:creationId xmlns:a16="http://schemas.microsoft.com/office/drawing/2014/main" id="{E0E50A44-B278-45BD-87DD-20F17B3E01F0}"/>
+                <a16:creationId xmlns:a16="http://schemas.microsoft.com/office/drawing/2014/main" xmlns="" id="{E0E50A44-B278-45BD-87DD-20F17B3E01F0}"/>
               </a:ext>
             </a:extLst>
           </p:cNvPr>
@@ -2003,7 +2003,7 @@
           <p:cNvPr id="5" name="Slide Number Placeholder 4">
             <a:extLst>
               <a:ext uri="{FF2B5EF4-FFF2-40B4-BE49-F238E27FC236}">
-                <a16:creationId xmlns:a16="http://schemas.microsoft.com/office/drawing/2014/main" id="{41067ED0-BA21-4A14-95AC-5DA4A5EEF7FD}"/>
+                <a16:creationId xmlns:a16="http://schemas.microsoft.com/office/drawing/2014/main" xmlns="" id="{41067ED0-BA21-4A14-95AC-5DA4A5EEF7FD}"/>
               </a:ext>
             </a:extLst>
           </p:cNvPr>
@@ -2062,7 +2062,7 @@
           <p:cNvPr id="2" name="Date Placeholder 1">
             <a:extLst>
               <a:ext uri="{FF2B5EF4-FFF2-40B4-BE49-F238E27FC236}">
-                <a16:creationId xmlns:a16="http://schemas.microsoft.com/office/drawing/2014/main" id="{59D23DE2-6438-4B51-9EBB-0A8BC23DE7D8}"/>
+                <a16:creationId xmlns:a16="http://schemas.microsoft.com/office/drawing/2014/main" xmlns="" id="{59D23DE2-6438-4B51-9EBB-0A8BC23DE7D8}"/>
               </a:ext>
             </a:extLst>
           </p:cNvPr>
@@ -2080,7 +2080,7 @@
           <a:p>
             <a:fld id="{4FAA584B-5F4A-43DA-A077-3E9FF98D4E55}" type="datetimeFigureOut">
               <a:rPr lang="en-US" smtClean="0"/>
-              <a:t>12/11/2017</a:t>
+              <a:t>12/12/2017</a:t>
             </a:fld>
             <a:endParaRPr lang="en-US"/>
           </a:p>
@@ -2091,7 +2091,7 @@
           <p:cNvPr id="3" name="Footer Placeholder 2">
             <a:extLst>
               <a:ext uri="{FF2B5EF4-FFF2-40B4-BE49-F238E27FC236}">
-                <a16:creationId xmlns:a16="http://schemas.microsoft.com/office/drawing/2014/main" id="{1F2D4C86-02B1-45A8-B13D-32E10B16A7F7}"/>
+                <a16:creationId xmlns:a16="http://schemas.microsoft.com/office/drawing/2014/main" xmlns="" id="{1F2D4C86-02B1-45A8-B13D-32E10B16A7F7}"/>
               </a:ext>
             </a:extLst>
           </p:cNvPr>
@@ -2116,7 +2116,7 @@
           <p:cNvPr id="4" name="Slide Number Placeholder 3">
             <a:extLst>
               <a:ext uri="{FF2B5EF4-FFF2-40B4-BE49-F238E27FC236}">
-                <a16:creationId xmlns:a16="http://schemas.microsoft.com/office/drawing/2014/main" id="{F5443C17-0899-4107-85BE-1AA0EBBA00C2}"/>
+                <a16:creationId xmlns:a16="http://schemas.microsoft.com/office/drawing/2014/main" xmlns="" id="{F5443C17-0899-4107-85BE-1AA0EBBA00C2}"/>
               </a:ext>
             </a:extLst>
           </p:cNvPr>
@@ -2175,7 +2175,7 @@
           <p:cNvPr id="2" name="Title 1">
             <a:extLst>
               <a:ext uri="{FF2B5EF4-FFF2-40B4-BE49-F238E27FC236}">
-                <a16:creationId xmlns:a16="http://schemas.microsoft.com/office/drawing/2014/main" id="{88664660-75F4-4E0C-BE2B-F37D6651245C}"/>
+                <a16:creationId xmlns:a16="http://schemas.microsoft.com/office/drawing/2014/main" xmlns="" id="{88664660-75F4-4E0C-BE2B-F37D6651245C}"/>
               </a:ext>
             </a:extLst>
           </p:cNvPr>
@@ -2212,7 +2212,7 @@
           <p:cNvPr id="3" name="Content Placeholder 2">
             <a:extLst>
               <a:ext uri="{FF2B5EF4-FFF2-40B4-BE49-F238E27FC236}">
-                <a16:creationId xmlns:a16="http://schemas.microsoft.com/office/drawing/2014/main" id="{87A05A77-4CC9-4B41-A742-4C688EF75246}"/>
+                <a16:creationId xmlns:a16="http://schemas.microsoft.com/office/drawing/2014/main" xmlns="" id="{87A05A77-4CC9-4B41-A742-4C688EF75246}"/>
               </a:ext>
             </a:extLst>
           </p:cNvPr>
@@ -2302,7 +2302,7 @@
           <p:cNvPr id="4" name="Text Placeholder 3">
             <a:extLst>
               <a:ext uri="{FF2B5EF4-FFF2-40B4-BE49-F238E27FC236}">
-                <a16:creationId xmlns:a16="http://schemas.microsoft.com/office/drawing/2014/main" id="{6E03B6DA-C92C-474C-8DE7-069BD63FA359}"/>
+                <a16:creationId xmlns:a16="http://schemas.microsoft.com/office/drawing/2014/main" xmlns="" id="{6E03B6DA-C92C-474C-8DE7-069BD63FA359}"/>
               </a:ext>
             </a:extLst>
           </p:cNvPr>
@@ -2373,7 +2373,7 @@
           <p:cNvPr id="5" name="Date Placeholder 4">
             <a:extLst>
               <a:ext uri="{FF2B5EF4-FFF2-40B4-BE49-F238E27FC236}">
-                <a16:creationId xmlns:a16="http://schemas.microsoft.com/office/drawing/2014/main" id="{1F6A10DA-843A-4B3D-A235-E33CBBB322BF}"/>
+                <a16:creationId xmlns:a16="http://schemas.microsoft.com/office/drawing/2014/main" xmlns="" id="{1F6A10DA-843A-4B3D-A235-E33CBBB322BF}"/>
               </a:ext>
             </a:extLst>
           </p:cNvPr>
@@ -2391,7 +2391,7 @@
           <a:p>
             <a:fld id="{4FAA584B-5F4A-43DA-A077-3E9FF98D4E55}" type="datetimeFigureOut">
               <a:rPr lang="en-US" smtClean="0"/>
-              <a:t>12/11/2017</a:t>
+              <a:t>12/12/2017</a:t>
             </a:fld>
             <a:endParaRPr lang="en-US"/>
           </a:p>
@@ -2402,7 +2402,7 @@
           <p:cNvPr id="6" name="Footer Placeholder 5">
             <a:extLst>
               <a:ext uri="{FF2B5EF4-FFF2-40B4-BE49-F238E27FC236}">
-                <a16:creationId xmlns:a16="http://schemas.microsoft.com/office/drawing/2014/main" id="{648B96C0-A759-4A57-9E62-336B8ED5EF0D}"/>
+                <a16:creationId xmlns:a16="http://schemas.microsoft.com/office/drawing/2014/main" xmlns="" id="{648B96C0-A759-4A57-9E62-336B8ED5EF0D}"/>
               </a:ext>
             </a:extLst>
           </p:cNvPr>
@@ -2427,7 +2427,7 @@
           <p:cNvPr id="7" name="Slide Number Placeholder 6">
             <a:extLst>
               <a:ext uri="{FF2B5EF4-FFF2-40B4-BE49-F238E27FC236}">
-                <a16:creationId xmlns:a16="http://schemas.microsoft.com/office/drawing/2014/main" id="{C70A4B41-64F6-4070-B9C1-D29FF6339BF7}"/>
+                <a16:creationId xmlns:a16="http://schemas.microsoft.com/office/drawing/2014/main" xmlns="" id="{C70A4B41-64F6-4070-B9C1-D29FF6339BF7}"/>
               </a:ext>
             </a:extLst>
           </p:cNvPr>
@@ -2486,7 +2486,7 @@
           <p:cNvPr id="2" name="Title 1">
             <a:extLst>
               <a:ext uri="{FF2B5EF4-FFF2-40B4-BE49-F238E27FC236}">
-                <a16:creationId xmlns:a16="http://schemas.microsoft.com/office/drawing/2014/main" id="{7BAE814D-5132-43D4-B17D-C9A6A04B3989}"/>
+                <a16:creationId xmlns:a16="http://schemas.microsoft.com/office/drawing/2014/main" xmlns="" id="{7BAE814D-5132-43D4-B17D-C9A6A04B3989}"/>
               </a:ext>
             </a:extLst>
           </p:cNvPr>
@@ -2523,7 +2523,7 @@
           <p:cNvPr id="3" name="Picture Placeholder 2">
             <a:extLst>
               <a:ext uri="{FF2B5EF4-FFF2-40B4-BE49-F238E27FC236}">
-                <a16:creationId xmlns:a16="http://schemas.microsoft.com/office/drawing/2014/main" id="{064A226D-E65D-4873-901A-054EE85D4245}"/>
+                <a16:creationId xmlns:a16="http://schemas.microsoft.com/office/drawing/2014/main" xmlns="" id="{064A226D-E65D-4873-901A-054EE85D4245}"/>
               </a:ext>
             </a:extLst>
           </p:cNvPr>
@@ -2590,7 +2590,7 @@
           <p:cNvPr id="4" name="Text Placeholder 3">
             <a:extLst>
               <a:ext uri="{FF2B5EF4-FFF2-40B4-BE49-F238E27FC236}">
-                <a16:creationId xmlns:a16="http://schemas.microsoft.com/office/drawing/2014/main" id="{3CB4554E-F371-4387-AC76-8C435E037BB9}"/>
+                <a16:creationId xmlns:a16="http://schemas.microsoft.com/office/drawing/2014/main" xmlns="" id="{3CB4554E-F371-4387-AC76-8C435E037BB9}"/>
               </a:ext>
             </a:extLst>
           </p:cNvPr>
@@ -2661,7 +2661,7 @@
           <p:cNvPr id="5" name="Date Placeholder 4">
             <a:extLst>
               <a:ext uri="{FF2B5EF4-FFF2-40B4-BE49-F238E27FC236}">
-                <a16:creationId xmlns:a16="http://schemas.microsoft.com/office/drawing/2014/main" id="{7D0E062C-31B7-4BE5-A7C0-214381F9A265}"/>
+                <a16:creationId xmlns:a16="http://schemas.microsoft.com/office/drawing/2014/main" xmlns="" id="{7D0E062C-31B7-4BE5-A7C0-214381F9A265}"/>
               </a:ext>
             </a:extLst>
           </p:cNvPr>
@@ -2679,7 +2679,7 @@
           <a:p>
             <a:fld id="{4FAA584B-5F4A-43DA-A077-3E9FF98D4E55}" type="datetimeFigureOut">
               <a:rPr lang="en-US" smtClean="0"/>
-              <a:t>12/11/2017</a:t>
+              <a:t>12/12/2017</a:t>
             </a:fld>
             <a:endParaRPr lang="en-US"/>
           </a:p>
@@ -2690,7 +2690,7 @@
           <p:cNvPr id="6" name="Footer Placeholder 5">
             <a:extLst>
               <a:ext uri="{FF2B5EF4-FFF2-40B4-BE49-F238E27FC236}">
-                <a16:creationId xmlns:a16="http://schemas.microsoft.com/office/drawing/2014/main" id="{82204432-1A32-4113-8D76-9AAA171FA7AB}"/>
+                <a16:creationId xmlns:a16="http://schemas.microsoft.com/office/drawing/2014/main" xmlns="" id="{82204432-1A32-4113-8D76-9AAA171FA7AB}"/>
               </a:ext>
             </a:extLst>
           </p:cNvPr>
@@ -2715,7 +2715,7 @@
           <p:cNvPr id="7" name="Slide Number Placeholder 6">
             <a:extLst>
               <a:ext uri="{FF2B5EF4-FFF2-40B4-BE49-F238E27FC236}">
-                <a16:creationId xmlns:a16="http://schemas.microsoft.com/office/drawing/2014/main" id="{5F196CC2-4C08-47B3-B113-F495C089FB4B}"/>
+                <a16:creationId xmlns:a16="http://schemas.microsoft.com/office/drawing/2014/main" xmlns="" id="{5F196CC2-4C08-47B3-B113-F495C089FB4B}"/>
               </a:ext>
             </a:extLst>
           </p:cNvPr>
@@ -2779,7 +2779,7 @@
           <p:cNvPr id="2" name="Title Placeholder 1">
             <a:extLst>
               <a:ext uri="{FF2B5EF4-FFF2-40B4-BE49-F238E27FC236}">
-                <a16:creationId xmlns:a16="http://schemas.microsoft.com/office/drawing/2014/main" id="{669DB9DF-9C77-44F5-BF74-6516A006E1E4}"/>
+                <a16:creationId xmlns:a16="http://schemas.microsoft.com/office/drawing/2014/main" xmlns="" id="{669DB9DF-9C77-44F5-BF74-6516A006E1E4}"/>
               </a:ext>
             </a:extLst>
           </p:cNvPr>
@@ -2817,7 +2817,7 @@
           <p:cNvPr id="3" name="Text Placeholder 2">
             <a:extLst>
               <a:ext uri="{FF2B5EF4-FFF2-40B4-BE49-F238E27FC236}">
-                <a16:creationId xmlns:a16="http://schemas.microsoft.com/office/drawing/2014/main" id="{F51534C6-AD2B-45EA-BA76-D2DF59073B96}"/>
+                <a16:creationId xmlns:a16="http://schemas.microsoft.com/office/drawing/2014/main" xmlns="" id="{F51534C6-AD2B-45EA-BA76-D2DF59073B96}"/>
               </a:ext>
             </a:extLst>
           </p:cNvPr>
@@ -2884,7 +2884,7 @@
           <p:cNvPr id="4" name="Date Placeholder 3">
             <a:extLst>
               <a:ext uri="{FF2B5EF4-FFF2-40B4-BE49-F238E27FC236}">
-                <a16:creationId xmlns:a16="http://schemas.microsoft.com/office/drawing/2014/main" id="{90B5D774-3689-41EB-8C28-1CD25A3B5D76}"/>
+                <a16:creationId xmlns:a16="http://schemas.microsoft.com/office/drawing/2014/main" xmlns="" id="{90B5D774-3689-41EB-8C28-1CD25A3B5D76}"/>
               </a:ext>
             </a:extLst>
           </p:cNvPr>
@@ -2920,7 +2920,7 @@
           <a:p>
             <a:fld id="{4FAA584B-5F4A-43DA-A077-3E9FF98D4E55}" type="datetimeFigureOut">
               <a:rPr lang="en-US" smtClean="0"/>
-              <a:t>12/11/2017</a:t>
+              <a:t>12/12/2017</a:t>
             </a:fld>
             <a:endParaRPr lang="en-US"/>
           </a:p>
@@ -2931,7 +2931,7 @@
           <p:cNvPr id="5" name="Footer Placeholder 4">
             <a:extLst>
               <a:ext uri="{FF2B5EF4-FFF2-40B4-BE49-F238E27FC236}">
-                <a16:creationId xmlns:a16="http://schemas.microsoft.com/office/drawing/2014/main" id="{82A10885-7FBD-4437-B402-6C90A33A0378}"/>
+                <a16:creationId xmlns:a16="http://schemas.microsoft.com/office/drawing/2014/main" xmlns="" id="{82A10885-7FBD-4437-B402-6C90A33A0378}"/>
               </a:ext>
             </a:extLst>
           </p:cNvPr>
@@ -2974,7 +2974,7 @@
           <p:cNvPr id="6" name="Slide Number Placeholder 5">
             <a:extLst>
               <a:ext uri="{FF2B5EF4-FFF2-40B4-BE49-F238E27FC236}">
-                <a16:creationId xmlns:a16="http://schemas.microsoft.com/office/drawing/2014/main" id="{6A155D42-7934-4F27-A703-E4962BB21A8C}"/>
+                <a16:creationId xmlns:a16="http://schemas.microsoft.com/office/drawing/2014/main" xmlns="" id="{6A155D42-7934-4F27-A703-E4962BB21A8C}"/>
               </a:ext>
             </a:extLst>
           </p:cNvPr>
@@ -3342,7 +3342,7 @@
           <p:cNvPr id="5" name="Picture 4">
             <a:extLst>
               <a:ext uri="{FF2B5EF4-FFF2-40B4-BE49-F238E27FC236}">
-                <a16:creationId xmlns:a16="http://schemas.microsoft.com/office/drawing/2014/main" id="{0228D2D1-8A91-46F4-B9A4-BD1C3D69107B}"/>
+                <a16:creationId xmlns:a16="http://schemas.microsoft.com/office/drawing/2014/main" xmlns="" id="{0228D2D1-8A91-46F4-B9A4-BD1C3D69107B}"/>
               </a:ext>
             </a:extLst>
           </p:cNvPr>
@@ -3377,7 +3377,7 @@
           <p:cNvPr id="2" name="Title 1">
             <a:extLst>
               <a:ext uri="{FF2B5EF4-FFF2-40B4-BE49-F238E27FC236}">
-                <a16:creationId xmlns:a16="http://schemas.microsoft.com/office/drawing/2014/main" id="{35B21367-BB4D-46FA-B543-280A817A3281}"/>
+                <a16:creationId xmlns:a16="http://schemas.microsoft.com/office/drawing/2014/main" xmlns="" id="{35B21367-BB4D-46FA-B543-280A817A3281}"/>
               </a:ext>
             </a:extLst>
           </p:cNvPr>
@@ -3423,7 +3423,7 @@
           <p:cNvPr id="3" name="Subtitle 2">
             <a:extLst>
               <a:ext uri="{FF2B5EF4-FFF2-40B4-BE49-F238E27FC236}">
-                <a16:creationId xmlns:a16="http://schemas.microsoft.com/office/drawing/2014/main" id="{B50F11A5-3F07-4159-9992-D122B991F306}"/>
+                <a16:creationId xmlns:a16="http://schemas.microsoft.com/office/drawing/2014/main" xmlns="" id="{B50F11A5-3F07-4159-9992-D122B991F306}"/>
               </a:ext>
             </a:extLst>
           </p:cNvPr>
@@ -3496,7 +3496,7 @@
           <p:cNvPr id="6" name="Subtitle 2">
             <a:extLst>
               <a:ext uri="{FF2B5EF4-FFF2-40B4-BE49-F238E27FC236}">
-                <a16:creationId xmlns:a16="http://schemas.microsoft.com/office/drawing/2014/main" id="{8BCC3C56-3F7C-40EB-8694-CB155BE4CFF9}"/>
+                <a16:creationId xmlns:a16="http://schemas.microsoft.com/office/drawing/2014/main" xmlns="" id="{8BCC3C56-3F7C-40EB-8694-CB155BE4CFF9}"/>
               </a:ext>
             </a:extLst>
           </p:cNvPr>
@@ -3680,7 +3680,7 @@
           <p:cNvPr id="9" name="Picture 8">
             <a:extLst>
               <a:ext uri="{FF2B5EF4-FFF2-40B4-BE49-F238E27FC236}">
-                <a16:creationId xmlns:a16="http://schemas.microsoft.com/office/drawing/2014/main" id="{B16995FB-FA49-4C16-A25D-1CFA8AC7F879}"/>
+                <a16:creationId xmlns:a16="http://schemas.microsoft.com/office/drawing/2014/main" xmlns="" id="{B16995FB-FA49-4C16-A25D-1CFA8AC7F879}"/>
               </a:ext>
             </a:extLst>
           </p:cNvPr>
@@ -3715,7 +3715,7 @@
           <p:cNvPr id="5" name="Title 1">
             <a:extLst>
               <a:ext uri="{FF2B5EF4-FFF2-40B4-BE49-F238E27FC236}">
-                <a16:creationId xmlns:a16="http://schemas.microsoft.com/office/drawing/2014/main" id="{1F6475E7-ABFA-4E7E-A753-BFA6CF9A645A}"/>
+                <a16:creationId xmlns:a16="http://schemas.microsoft.com/office/drawing/2014/main" xmlns="" id="{1F6475E7-ABFA-4E7E-A753-BFA6CF9A645A}"/>
               </a:ext>
             </a:extLst>
           </p:cNvPr>
@@ -3781,7 +3781,7 @@
           <p:cNvPr id="8" name="Subtitle 2">
             <a:extLst>
               <a:ext uri="{FF2B5EF4-FFF2-40B4-BE49-F238E27FC236}">
-                <a16:creationId xmlns:a16="http://schemas.microsoft.com/office/drawing/2014/main" id="{C76F5E16-42CA-4CF6-9B69-90D4F59303CB}"/>
+                <a16:creationId xmlns:a16="http://schemas.microsoft.com/office/drawing/2014/main" xmlns="" id="{C76F5E16-42CA-4CF6-9B69-90D4F59303CB}"/>
               </a:ext>
             </a:extLst>
           </p:cNvPr>
@@ -4046,7 +4046,7 @@
           <p:cNvPr id="8" name="Picture 7">
             <a:extLst>
               <a:ext uri="{FF2B5EF4-FFF2-40B4-BE49-F238E27FC236}">
-                <a16:creationId xmlns:a16="http://schemas.microsoft.com/office/drawing/2014/main" id="{0AB39B3B-F41A-436E-8DA5-1B87F52C58E2}"/>
+                <a16:creationId xmlns:a16="http://schemas.microsoft.com/office/drawing/2014/main" xmlns="" id="{0AB39B3B-F41A-436E-8DA5-1B87F52C58E2}"/>
               </a:ext>
             </a:extLst>
           </p:cNvPr>
@@ -4081,7 +4081,7 @@
           <p:cNvPr id="5" name="Title 1">
             <a:extLst>
               <a:ext uri="{FF2B5EF4-FFF2-40B4-BE49-F238E27FC236}">
-                <a16:creationId xmlns:a16="http://schemas.microsoft.com/office/drawing/2014/main" id="{1F6475E7-ABFA-4E7E-A753-BFA6CF9A645A}"/>
+                <a16:creationId xmlns:a16="http://schemas.microsoft.com/office/drawing/2014/main" xmlns="" id="{1F6475E7-ABFA-4E7E-A753-BFA6CF9A645A}"/>
               </a:ext>
             </a:extLst>
           </p:cNvPr>
@@ -4107,7 +4107,7 @@
         </p:spPr>
         <p:txBody>
           <a:bodyPr vert="horz" lIns="91440" tIns="45720" rIns="91440" bIns="45720" rtlCol="0" anchor="ctr">
-            <a:normAutofit fontScale="92500"/>
+            <a:normAutofit/>
           </a:bodyPr>
           <a:lstStyle>
             <a:lvl1pPr algn="l" defTabSz="914400" rtl="0" eaLnBrk="1" latinLnBrk="0" hangingPunct="1">
@@ -4147,7 +4147,7 @@
           <p:cNvPr id="7" name="Subtitle 2">
             <a:extLst>
               <a:ext uri="{FF2B5EF4-FFF2-40B4-BE49-F238E27FC236}">
-                <a16:creationId xmlns:a16="http://schemas.microsoft.com/office/drawing/2014/main" id="{ABC956EB-033B-4C61-A41A-A930E9EA1A03}"/>
+                <a16:creationId xmlns:a16="http://schemas.microsoft.com/office/drawing/2014/main" xmlns="" id="{ABC956EB-033B-4C61-A41A-A930E9EA1A03}"/>
               </a:ext>
             </a:extLst>
           </p:cNvPr>
@@ -4158,8 +4158,8 @@
         </p:nvSpPr>
         <p:spPr>
           <a:xfrm>
-            <a:off x="2391055" y="2107242"/>
-            <a:ext cx="7551938" cy="4137915"/>
+            <a:off x="732363" y="1873147"/>
+            <a:ext cx="10936474" cy="5068341"/>
           </a:xfrm>
           <a:prstGeom prst="rect">
             <a:avLst/>
@@ -4351,41 +4351,35 @@
           <a:p>
             <a:pPr lvl="1"/>
             <a:r>
-              <a:rPr lang="en-US" sz="3600" dirty="0">
+              <a:rPr lang="en-US" sz="3600" dirty="0" smtClean="0">
                 <a:solidFill>
                   <a:schemeClr val="bg1"/>
                 </a:solidFill>
                 <a:latin typeface="Berlin Sans FB Demi" panose="020E0802020502020306" pitchFamily="34" charset="0"/>
               </a:rPr>
-              <a:t>No weekend plans</a:t>
-            </a:r>
-          </a:p>
-          <a:p>
-            <a:pPr lvl="1"/>
-            <a:r>
-              <a:rPr lang="en-US" sz="3600" dirty="0">
+              <a:t>Provide users with a unique and entertaining way to plan their </a:t>
+            </a:r>
+            <a:r>
+              <a:rPr lang="en-US" sz="3600" dirty="0" smtClean="0">
                 <a:solidFill>
                   <a:schemeClr val="bg1"/>
                 </a:solidFill>
                 <a:latin typeface="Berlin Sans FB Demi" panose="020E0802020502020306" pitchFamily="34" charset="0"/>
               </a:rPr>
-              <a:t>In the style of a game, randomly generate user experiences that includes food and activity</a:t>
+              <a:t>Friday night.  </a:t>
             </a:r>
           </a:p>
           <a:p>
             <a:pPr lvl="1"/>
             <a:r>
-              <a:rPr lang="en-US" sz="3600" dirty="0">
+              <a:rPr lang="en-US" sz="3600" dirty="0" smtClean="0">
                 <a:solidFill>
                   <a:schemeClr val="bg1"/>
                 </a:solidFill>
                 <a:latin typeface="Berlin Sans FB Demi" panose="020E0802020502020306" pitchFamily="34" charset="0"/>
               </a:rPr>
-              <a:t>Cater to individuals who want to go out or stay at home</a:t>
-            </a:r>
-          </a:p>
-          <a:p>
-            <a:pPr lvl="1"/>
+              <a:t>In </a:t>
+            </a:r>
             <a:r>
               <a:rPr lang="en-US" sz="3600" dirty="0">
                 <a:solidFill>
@@ -4393,8 +4387,86 @@
                 </a:solidFill>
                 <a:latin typeface="Berlin Sans FB Demi" panose="020E0802020502020306" pitchFamily="34" charset="0"/>
               </a:rPr>
-              <a:t>Gambling theme </a:t>
-            </a:r>
+              <a:t>the style of a game, </a:t>
+            </a:r>
+            <a:r>
+              <a:rPr lang="en-US" sz="3600" dirty="0" smtClean="0">
+                <a:solidFill>
+                  <a:schemeClr val="bg1"/>
+                </a:solidFill>
+                <a:latin typeface="Berlin Sans FB Demi" panose="020E0802020502020306" pitchFamily="34" charset="0"/>
+              </a:rPr>
+              <a:t>the user answers questions that are used as inputs to randomly </a:t>
+            </a:r>
+            <a:r>
+              <a:rPr lang="en-US" sz="3600" dirty="0">
+                <a:solidFill>
+                  <a:schemeClr val="bg1"/>
+                </a:solidFill>
+                <a:latin typeface="Berlin Sans FB Demi" panose="020E0802020502020306" pitchFamily="34" charset="0"/>
+              </a:rPr>
+              <a:t>generate </a:t>
+            </a:r>
+            <a:r>
+              <a:rPr lang="en-US" sz="3600" dirty="0" smtClean="0">
+                <a:solidFill>
+                  <a:schemeClr val="bg1"/>
+                </a:solidFill>
+                <a:latin typeface="Berlin Sans FB Demi" panose="020E0802020502020306" pitchFamily="34" charset="0"/>
+              </a:rPr>
+              <a:t>a dining option and an activity option.</a:t>
+            </a:r>
+            <a:endParaRPr lang="en-US" sz="3600" dirty="0">
+              <a:solidFill>
+                <a:schemeClr val="bg1"/>
+              </a:solidFill>
+              <a:latin typeface="Berlin Sans FB Demi" panose="020E0802020502020306" pitchFamily="34" charset="0"/>
+            </a:endParaRPr>
+          </a:p>
+          <a:p>
+            <a:pPr lvl="1"/>
+            <a:r>
+              <a:rPr lang="en-US" sz="3600" dirty="0">
+                <a:solidFill>
+                  <a:schemeClr val="bg1"/>
+                </a:solidFill>
+                <a:latin typeface="Berlin Sans FB Demi" panose="020E0802020502020306" pitchFamily="34" charset="0"/>
+              </a:rPr>
+              <a:t>Cater to individuals who want to go out or stay at </a:t>
+            </a:r>
+            <a:r>
+              <a:rPr lang="en-US" sz="3600" dirty="0" smtClean="0">
+                <a:solidFill>
+                  <a:schemeClr val="bg1"/>
+                </a:solidFill>
+                <a:latin typeface="Berlin Sans FB Demi" panose="020E0802020502020306" pitchFamily="34" charset="0"/>
+              </a:rPr>
+              <a:t>home.</a:t>
+            </a:r>
+            <a:endParaRPr lang="en-US" sz="3600" dirty="0">
+              <a:solidFill>
+                <a:schemeClr val="bg1"/>
+              </a:solidFill>
+              <a:latin typeface="Berlin Sans FB Demi" panose="020E0802020502020306" pitchFamily="34" charset="0"/>
+            </a:endParaRPr>
+          </a:p>
+          <a:p>
+            <a:pPr lvl="1"/>
+            <a:r>
+              <a:rPr lang="en-US" sz="3600" dirty="0" smtClean="0">
+                <a:solidFill>
+                  <a:schemeClr val="bg1"/>
+                </a:solidFill>
+                <a:latin typeface="Berlin Sans FB Demi" panose="020E0802020502020306" pitchFamily="34" charset="0"/>
+              </a:rPr>
+              <a:t>Gambling/casino theme present throughout user experience.</a:t>
+            </a:r>
+            <a:endParaRPr lang="en-US" sz="3600" dirty="0">
+              <a:solidFill>
+                <a:schemeClr val="bg1"/>
+              </a:solidFill>
+              <a:latin typeface="Berlin Sans FB Demi" panose="020E0802020502020306" pitchFamily="34" charset="0"/>
+            </a:endParaRPr>
           </a:p>
           <a:p>
             <a:endParaRPr lang="en-US" sz="3600" dirty="0">
@@ -4450,7 +4522,7 @@
           <p:cNvPr id="7" name="Picture 6">
             <a:extLst>
               <a:ext uri="{FF2B5EF4-FFF2-40B4-BE49-F238E27FC236}">
-                <a16:creationId xmlns:a16="http://schemas.microsoft.com/office/drawing/2014/main" id="{828BFF34-A46F-4064-8D9A-522A2C539F60}"/>
+                <a16:creationId xmlns:a16="http://schemas.microsoft.com/office/drawing/2014/main" xmlns="" id="{828BFF34-A46F-4064-8D9A-522A2C539F60}"/>
               </a:ext>
             </a:extLst>
           </p:cNvPr>
@@ -4485,7 +4557,7 @@
           <p:cNvPr id="5" name="Title 1">
             <a:extLst>
               <a:ext uri="{FF2B5EF4-FFF2-40B4-BE49-F238E27FC236}">
-                <a16:creationId xmlns:a16="http://schemas.microsoft.com/office/drawing/2014/main" id="{1F6475E7-ABFA-4E7E-A753-BFA6CF9A645A}"/>
+                <a16:creationId xmlns:a16="http://schemas.microsoft.com/office/drawing/2014/main" xmlns="" id="{1F6475E7-ABFA-4E7E-A753-BFA6CF9A645A}"/>
               </a:ext>
             </a:extLst>
           </p:cNvPr>
@@ -4581,7 +4653,7 @@
           <p:cNvPr id="8" name="Picture 7">
             <a:extLst>
               <a:ext uri="{FF2B5EF4-FFF2-40B4-BE49-F238E27FC236}">
-                <a16:creationId xmlns:a16="http://schemas.microsoft.com/office/drawing/2014/main" id="{3980A244-1F4D-4FC3-98FC-1096A6FB6EAE}"/>
+                <a16:creationId xmlns:a16="http://schemas.microsoft.com/office/drawing/2014/main" xmlns="" id="{3980A244-1F4D-4FC3-98FC-1096A6FB6EAE}"/>
               </a:ext>
             </a:extLst>
           </p:cNvPr>
@@ -4616,7 +4688,7 @@
           <p:cNvPr id="5" name="Title 1">
             <a:extLst>
               <a:ext uri="{FF2B5EF4-FFF2-40B4-BE49-F238E27FC236}">
-                <a16:creationId xmlns:a16="http://schemas.microsoft.com/office/drawing/2014/main" id="{1F6475E7-ABFA-4E7E-A753-BFA6CF9A645A}"/>
+                <a16:creationId xmlns:a16="http://schemas.microsoft.com/office/drawing/2014/main" xmlns="" id="{1F6475E7-ABFA-4E7E-A753-BFA6CF9A645A}"/>
               </a:ext>
             </a:extLst>
           </p:cNvPr>
@@ -4682,7 +4754,7 @@
           <p:cNvPr id="7" name="Subtitle 2">
             <a:extLst>
               <a:ext uri="{FF2B5EF4-FFF2-40B4-BE49-F238E27FC236}">
-                <a16:creationId xmlns:a16="http://schemas.microsoft.com/office/drawing/2014/main" id="{98ED2A61-F526-4AA4-AAC9-E9C8240607C8}"/>
+                <a16:creationId xmlns:a16="http://schemas.microsoft.com/office/drawing/2014/main" xmlns="" id="{98ED2A61-F526-4AA4-AAC9-E9C8240607C8}"/>
               </a:ext>
             </a:extLst>
           </p:cNvPr>
@@ -4915,8 +4987,41 @@
                 </a:solidFill>
                 <a:latin typeface="Berlin Sans FB Demi" panose="020E0802020502020306" pitchFamily="34" charset="0"/>
               </a:rPr>
-              <a:t>Sketched stages of the game</a:t>
-            </a:r>
+              <a:t>Sketched stages of the </a:t>
+            </a:r>
+            <a:r>
+              <a:rPr lang="en-US" sz="3200" dirty="0" smtClean="0">
+                <a:solidFill>
+                  <a:schemeClr val="bg1"/>
+                </a:solidFill>
+                <a:latin typeface="Berlin Sans FB Demi" panose="020E0802020502020306" pitchFamily="34" charset="0"/>
+              </a:rPr>
+              <a:t>game (flow chart</a:t>
+            </a:r>
+            <a:r>
+              <a:rPr lang="en-US" sz="3200" smtClean="0">
+                <a:solidFill>
+                  <a:schemeClr val="bg1"/>
+                </a:solidFill>
+                <a:latin typeface="Berlin Sans FB Demi" panose="020E0802020502020306" pitchFamily="34" charset="0"/>
+              </a:rPr>
+              <a:t>, pseudocode, </a:t>
+            </a:r>
+            <a:r>
+              <a:rPr lang="en-US" sz="3200" dirty="0" smtClean="0">
+                <a:solidFill>
+                  <a:schemeClr val="bg1"/>
+                </a:solidFill>
+                <a:latin typeface="Berlin Sans FB Demi" panose="020E0802020502020306" pitchFamily="34" charset="0"/>
+              </a:rPr>
+              <a:t>user stories)</a:t>
+            </a:r>
+            <a:endParaRPr lang="en-US" sz="3200" dirty="0">
+              <a:solidFill>
+                <a:schemeClr val="bg1"/>
+              </a:solidFill>
+              <a:latin typeface="Berlin Sans FB Demi" panose="020E0802020502020306" pitchFamily="34" charset="0"/>
+            </a:endParaRPr>
           </a:p>
           <a:p>
             <a:pPr lvl="1"/>
@@ -4933,17 +5038,14 @@
           <a:p>
             <a:pPr lvl="1"/>
             <a:r>
-              <a:rPr lang="en-US" sz="3200" dirty="0">
+              <a:rPr lang="en-US" sz="3200" dirty="0" smtClean="0">
                 <a:solidFill>
                   <a:schemeClr val="bg1"/>
                 </a:solidFill>
                 <a:latin typeface="Berlin Sans FB Demi" panose="020E0802020502020306" pitchFamily="34" charset="0"/>
               </a:rPr>
-              <a:t>Wanted user to be in suspense</a:t>
-            </a:r>
-          </a:p>
-          <a:p>
-            <a:pPr lvl="1"/>
+              <a:t>Added </a:t>
+            </a:r>
             <a:r>
               <a:rPr lang="en-US" sz="3200" dirty="0">
                 <a:solidFill>
@@ -4951,19 +5053,37 @@
                 </a:solidFill>
                 <a:latin typeface="Berlin Sans FB Demi" panose="020E0802020502020306" pitchFamily="34" charset="0"/>
               </a:rPr>
-              <a:t>Added features to enhance user experience</a:t>
-            </a:r>
-          </a:p>
-          <a:p>
-            <a:pPr lvl="1"/>
-            <a:r>
-              <a:rPr lang="en-US" sz="3200" dirty="0">
+              <a:t>features to enhance user </a:t>
+            </a:r>
+            <a:r>
+              <a:rPr lang="en-US" sz="3200" dirty="0" smtClean="0">
                 <a:solidFill>
                   <a:schemeClr val="bg1"/>
                 </a:solidFill>
                 <a:latin typeface="Berlin Sans FB Demi" panose="020E0802020502020306" pitchFamily="34" charset="0"/>
               </a:rPr>
-              <a:t>Styling and language changes to fit theme</a:t>
+              <a:t>experience (suspense, refresh etc.)</a:t>
+            </a:r>
+          </a:p>
+          <a:p>
+            <a:pPr lvl="1"/>
+            <a:r>
+              <a:rPr lang="en-US" sz="3200" dirty="0" smtClean="0">
+                <a:solidFill>
+                  <a:schemeClr val="bg1"/>
+                </a:solidFill>
+                <a:latin typeface="Berlin Sans FB Demi" panose="020E0802020502020306" pitchFamily="34" charset="0"/>
+              </a:rPr>
+              <a:t>Styling </a:t>
+            </a:r>
+            <a:r>
+              <a:rPr lang="en-US" sz="3200" dirty="0">
+                <a:solidFill>
+                  <a:schemeClr val="bg1"/>
+                </a:solidFill>
+                <a:latin typeface="Berlin Sans FB Demi" panose="020E0802020502020306" pitchFamily="34" charset="0"/>
+              </a:rPr>
+              <a:t>and language changes to fit theme</a:t>
             </a:r>
           </a:p>
           <a:p>
@@ -5030,7 +5150,7 @@
           <p:cNvPr id="7" name="Picture 6">
             <a:extLst>
               <a:ext uri="{FF2B5EF4-FFF2-40B4-BE49-F238E27FC236}">
-                <a16:creationId xmlns:a16="http://schemas.microsoft.com/office/drawing/2014/main" id="{BD104E08-7482-4CF0-8831-7D6139B28B99}"/>
+                <a16:creationId xmlns:a16="http://schemas.microsoft.com/office/drawing/2014/main" xmlns="" id="{BD104E08-7482-4CF0-8831-7D6139B28B99}"/>
               </a:ext>
             </a:extLst>
           </p:cNvPr>
@@ -5065,7 +5185,7 @@
           <p:cNvPr id="5" name="Title 1">
             <a:extLst>
               <a:ext uri="{FF2B5EF4-FFF2-40B4-BE49-F238E27FC236}">
-                <a16:creationId xmlns:a16="http://schemas.microsoft.com/office/drawing/2014/main" id="{1F6475E7-ABFA-4E7E-A753-BFA6CF9A645A}"/>
+                <a16:creationId xmlns:a16="http://schemas.microsoft.com/office/drawing/2014/main" xmlns="" id="{1F6475E7-ABFA-4E7E-A753-BFA6CF9A645A}"/>
               </a:ext>
             </a:extLst>
           </p:cNvPr>
@@ -5131,7 +5251,7 @@
           <p:cNvPr id="6" name="Subtitle 2">
             <a:extLst>
               <a:ext uri="{FF2B5EF4-FFF2-40B4-BE49-F238E27FC236}">
-                <a16:creationId xmlns:a16="http://schemas.microsoft.com/office/drawing/2014/main" id="{3DD050B4-3353-45A0-B158-2E6B32948D18}"/>
+                <a16:creationId xmlns:a16="http://schemas.microsoft.com/office/drawing/2014/main" xmlns="" id="{3DD050B4-3353-45A0-B158-2E6B32948D18}"/>
               </a:ext>
             </a:extLst>
           </p:cNvPr>
@@ -5441,7 +5561,7 @@
           <p:cNvPr id="8" name="Subtitle 2">
             <a:extLst>
               <a:ext uri="{FF2B5EF4-FFF2-40B4-BE49-F238E27FC236}">
-                <a16:creationId xmlns:a16="http://schemas.microsoft.com/office/drawing/2014/main" id="{0017EC3E-C236-4122-96A5-C2658CAE0E38}"/>
+                <a16:creationId xmlns:a16="http://schemas.microsoft.com/office/drawing/2014/main" xmlns="" id="{0017EC3E-C236-4122-96A5-C2658CAE0E38}"/>
               </a:ext>
             </a:extLst>
           </p:cNvPr>
@@ -5745,39 +5865,24 @@
             </a:r>
           </a:p>
           <a:p>
-            <a:pPr lvl="3"/>
-            <a:r>
-              <a:rPr lang="en-US" sz="2600" dirty="0">
+            <a:pPr lvl="2"/>
+            <a:r>
+              <a:rPr lang="en-US" sz="2800" dirty="0" smtClean="0">
                 <a:solidFill>
                   <a:schemeClr val="bg1"/>
                 </a:solidFill>
                 <a:latin typeface="Berlin Sans FB Demi" panose="020E0802020502020306" pitchFamily="34" charset="0"/>
               </a:rPr>
-              <a:t>From start </a:t>
-            </a:r>
-          </a:p>
-          <a:p>
-            <a:pPr lvl="3"/>
-            <a:r>
-              <a:rPr lang="en-US" sz="2600" dirty="0">
+              <a:t>Radio </a:t>
+            </a:r>
+            <a:r>
+              <a:rPr lang="en-US" sz="2800" dirty="0">
                 <a:solidFill>
                   <a:schemeClr val="bg1"/>
                 </a:solidFill>
                 <a:latin typeface="Berlin Sans FB Demi" panose="020E0802020502020306" pitchFamily="34" charset="0"/>
               </a:rPr>
-              <a:t>From selected point in song</a:t>
-            </a:r>
-          </a:p>
-          <a:p>
-            <a:pPr lvl="2"/>
-            <a:r>
-              <a:rPr lang="en-US" sz="2800" dirty="0">
-                <a:solidFill>
-                  <a:schemeClr val="bg1"/>
-                </a:solidFill>
-                <a:latin typeface="Berlin Sans FB Demi" panose="020E0802020502020306" pitchFamily="34" charset="0"/>
-              </a:rPr>
-              <a:t>Radio buttons</a:t>
+              <a:t>buttons</a:t>
             </a:r>
           </a:p>
         </p:txBody>
@@ -5817,7 +5922,7 @@
           <p:cNvPr id="8" name="Picture 7">
             <a:extLst>
               <a:ext uri="{FF2B5EF4-FFF2-40B4-BE49-F238E27FC236}">
-                <a16:creationId xmlns:a16="http://schemas.microsoft.com/office/drawing/2014/main" id="{31354E8E-4504-437B-B04F-DDE13EDBD2CB}"/>
+                <a16:creationId xmlns:a16="http://schemas.microsoft.com/office/drawing/2014/main" xmlns="" id="{31354E8E-4504-437B-B04F-DDE13EDBD2CB}"/>
               </a:ext>
             </a:extLst>
           </p:cNvPr>
@@ -5852,7 +5957,7 @@
           <p:cNvPr id="5" name="Title 1">
             <a:extLst>
               <a:ext uri="{FF2B5EF4-FFF2-40B4-BE49-F238E27FC236}">
-                <a16:creationId xmlns:a16="http://schemas.microsoft.com/office/drawing/2014/main" id="{1F6475E7-ABFA-4E7E-A753-BFA6CF9A645A}"/>
+                <a16:creationId xmlns:a16="http://schemas.microsoft.com/office/drawing/2014/main" xmlns="" id="{1F6475E7-ABFA-4E7E-A753-BFA6CF9A645A}"/>
               </a:ext>
             </a:extLst>
           </p:cNvPr>
@@ -5918,7 +6023,7 @@
           <p:cNvPr id="7" name="Subtitle 2">
             <a:extLst>
               <a:ext uri="{FF2B5EF4-FFF2-40B4-BE49-F238E27FC236}">
-                <a16:creationId xmlns:a16="http://schemas.microsoft.com/office/drawing/2014/main" id="{8FAF6F91-F699-41E2-BF4F-32414B647943}"/>
+                <a16:creationId xmlns:a16="http://schemas.microsoft.com/office/drawing/2014/main" xmlns="" id="{8FAF6F91-F699-41E2-BF4F-32414B647943}"/>
               </a:ext>
             </a:extLst>
           </p:cNvPr>
@@ -6269,7 +6374,7 @@
           <p:cNvPr id="7" name="Picture 6">
             <a:extLst>
               <a:ext uri="{FF2B5EF4-FFF2-40B4-BE49-F238E27FC236}">
-                <a16:creationId xmlns:a16="http://schemas.microsoft.com/office/drawing/2014/main" id="{828BFF34-A46F-4064-8D9A-522A2C539F60}"/>
+                <a16:creationId xmlns:a16="http://schemas.microsoft.com/office/drawing/2014/main" xmlns="" id="{828BFF34-A46F-4064-8D9A-522A2C539F60}"/>
               </a:ext>
             </a:extLst>
           </p:cNvPr>
@@ -6304,7 +6409,7 @@
           <p:cNvPr id="5" name="Title 1">
             <a:extLst>
               <a:ext uri="{FF2B5EF4-FFF2-40B4-BE49-F238E27FC236}">
-                <a16:creationId xmlns:a16="http://schemas.microsoft.com/office/drawing/2014/main" id="{1F6475E7-ABFA-4E7E-A753-BFA6CF9A645A}"/>
+                <a16:creationId xmlns:a16="http://schemas.microsoft.com/office/drawing/2014/main" xmlns="" id="{1F6475E7-ABFA-4E7E-A753-BFA6CF9A645A}"/>
               </a:ext>
             </a:extLst>
           </p:cNvPr>

</xml_diff>